<commit_message>
https://jira.hl7.org/browse/FHIR-49085 - In diagram, corrected "Payer CDA System" to "Payer CDS System"
</commit_message>
<xml_diff>
--- a/input/images-source/hooks.pptx
+++ b/input/images-source/hooks.pptx
@@ -243,7 +243,7 @@
           <a:p>
             <a:fld id="{5C14F7F8-4127-44F8-B9D4-35BAD9530B4E}" type="datetimeFigureOut">
               <a:rPr lang="en-CA" smtClean="0"/>
-              <a:t>2024-10-29</a:t>
+              <a:t>2025-07-18</a:t>
             </a:fld>
             <a:endParaRPr lang="en-CA"/>
           </a:p>
@@ -413,7 +413,7 @@
           <a:p>
             <a:fld id="{5C14F7F8-4127-44F8-B9D4-35BAD9530B4E}" type="datetimeFigureOut">
               <a:rPr lang="en-CA" smtClean="0"/>
-              <a:t>2024-10-29</a:t>
+              <a:t>2025-07-18</a:t>
             </a:fld>
             <a:endParaRPr lang="en-CA"/>
           </a:p>
@@ -593,7 +593,7 @@
           <a:p>
             <a:fld id="{5C14F7F8-4127-44F8-B9D4-35BAD9530B4E}" type="datetimeFigureOut">
               <a:rPr lang="en-CA" smtClean="0"/>
-              <a:t>2024-10-29</a:t>
+              <a:t>2025-07-18</a:t>
             </a:fld>
             <a:endParaRPr lang="en-CA"/>
           </a:p>
@@ -763,7 +763,7 @@
           <a:p>
             <a:fld id="{5C14F7F8-4127-44F8-B9D4-35BAD9530B4E}" type="datetimeFigureOut">
               <a:rPr lang="en-CA" smtClean="0"/>
-              <a:t>2024-10-29</a:t>
+              <a:t>2025-07-18</a:t>
             </a:fld>
             <a:endParaRPr lang="en-CA"/>
           </a:p>
@@ -1007,7 +1007,7 @@
           <a:p>
             <a:fld id="{5C14F7F8-4127-44F8-B9D4-35BAD9530B4E}" type="datetimeFigureOut">
               <a:rPr lang="en-CA" smtClean="0"/>
-              <a:t>2024-10-29</a:t>
+              <a:t>2025-07-18</a:t>
             </a:fld>
             <a:endParaRPr lang="en-CA"/>
           </a:p>
@@ -1239,7 +1239,7 @@
           <a:p>
             <a:fld id="{5C14F7F8-4127-44F8-B9D4-35BAD9530B4E}" type="datetimeFigureOut">
               <a:rPr lang="en-CA" smtClean="0"/>
-              <a:t>2024-10-29</a:t>
+              <a:t>2025-07-18</a:t>
             </a:fld>
             <a:endParaRPr lang="en-CA"/>
           </a:p>
@@ -1606,7 +1606,7 @@
           <a:p>
             <a:fld id="{5C14F7F8-4127-44F8-B9D4-35BAD9530B4E}" type="datetimeFigureOut">
               <a:rPr lang="en-CA" smtClean="0"/>
-              <a:t>2024-10-29</a:t>
+              <a:t>2025-07-18</a:t>
             </a:fld>
             <a:endParaRPr lang="en-CA"/>
           </a:p>
@@ -1724,7 +1724,7 @@
           <a:p>
             <a:fld id="{5C14F7F8-4127-44F8-B9D4-35BAD9530B4E}" type="datetimeFigureOut">
               <a:rPr lang="en-CA" smtClean="0"/>
-              <a:t>2024-10-29</a:t>
+              <a:t>2025-07-18</a:t>
             </a:fld>
             <a:endParaRPr lang="en-CA"/>
           </a:p>
@@ -1819,7 +1819,7 @@
           <a:p>
             <a:fld id="{5C14F7F8-4127-44F8-B9D4-35BAD9530B4E}" type="datetimeFigureOut">
               <a:rPr lang="en-CA" smtClean="0"/>
-              <a:t>2024-10-29</a:t>
+              <a:t>2025-07-18</a:t>
             </a:fld>
             <a:endParaRPr lang="en-CA"/>
           </a:p>
@@ -2096,7 +2096,7 @@
           <a:p>
             <a:fld id="{5C14F7F8-4127-44F8-B9D4-35BAD9530B4E}" type="datetimeFigureOut">
               <a:rPr lang="en-CA" smtClean="0"/>
-              <a:t>2024-10-29</a:t>
+              <a:t>2025-07-18</a:t>
             </a:fld>
             <a:endParaRPr lang="en-CA"/>
           </a:p>
@@ -2353,7 +2353,7 @@
           <a:p>
             <a:fld id="{5C14F7F8-4127-44F8-B9D4-35BAD9530B4E}" type="datetimeFigureOut">
               <a:rPr lang="en-CA" smtClean="0"/>
-              <a:t>2024-10-29</a:t>
+              <a:t>2025-07-18</a:t>
             </a:fld>
             <a:endParaRPr lang="en-CA"/>
           </a:p>
@@ -2566,7 +2566,7 @@
           <a:p>
             <a:fld id="{5C14F7F8-4127-44F8-B9D4-35BAD9530B4E}" type="datetimeFigureOut">
               <a:rPr lang="en-CA" smtClean="0"/>
-              <a:t>2024-10-29</a:t>
+              <a:t>2025-07-18</a:t>
             </a:fld>
             <a:endParaRPr lang="en-CA"/>
           </a:p>
@@ -3921,7 +3921,7 @@
                     <a:sysClr val="windowText" lastClr="000000"/>
                   </a:solidFill>
                 </a:rPr>
-                <a:t>Payer CDA / Production Systems</a:t>
+                <a:t>Payer CDS / Production Systems</a:t>
               </a:r>
               <a:endParaRPr lang="en-CA" sz="1200" dirty="0">
                 <a:ln w="3175">
@@ -3995,7 +3995,7 @@
                     <a:sysClr val="windowText" lastClr="000000"/>
                   </a:solidFill>
                 </a:rPr>
-                <a:t>Payer CDA / Production Systems</a:t>
+                <a:t>Payer CDS / Production Systems</a:t>
               </a:r>
               <a:endParaRPr lang="en-CA" sz="1200" dirty="0">
                 <a:ln w="3175">
@@ -4069,7 +4069,7 @@
                     <a:sysClr val="windowText" lastClr="000000"/>
                   </a:solidFill>
                 </a:rPr>
-                <a:t>Payer CDA / Production Systems</a:t>
+                <a:t>Payer CDS / Production Systems</a:t>
               </a:r>
               <a:endParaRPr lang="en-CA" sz="1200" dirty="0">
                 <a:ln w="3175">
@@ -4143,7 +4143,7 @@
                     <a:sysClr val="windowText" lastClr="000000"/>
                   </a:solidFill>
                 </a:rPr>
-                <a:t>Payer CDA / Production Systems</a:t>
+                <a:t>Payer CDS / Production Systems</a:t>
               </a:r>
               <a:endParaRPr lang="en-CA" sz="1200" dirty="0">
                 <a:ln w="3175">
@@ -4217,7 +4217,7 @@
                     <a:sysClr val="windowText" lastClr="000000"/>
                   </a:solidFill>
                 </a:rPr>
-                <a:t>Payer CDA / Production Systems</a:t>
+                <a:t>Payer CDS / Production Systems</a:t>
               </a:r>
               <a:endParaRPr lang="en-CA" sz="1200" dirty="0">
                 <a:ln w="3175">
@@ -4291,7 +4291,7 @@
                     <a:sysClr val="windowText" lastClr="000000"/>
                   </a:solidFill>
                 </a:rPr>
-                <a:t>Payer CDA / Production Systems</a:t>
+                <a:t>Payer CDS / Production Systems</a:t>
               </a:r>
               <a:endParaRPr lang="en-CA" sz="1200" dirty="0">
                 <a:ln w="3175">

</xml_diff>